<commit_message>
user and owner admin pages
</commit_message>
<xml_diff>
--- a/milosmission.pptx
+++ b/milosmission.pptx
@@ -104,6 +104,11 @@
       </a:defRPr>
     </a:lvl9pPr>
   </p:defaultTextStyle>
+  <p:extLst>
+    <p:ext uri="{EFAFB233-063F-42B5-8137-9DF3F51BA10A}">
+      <p15:sldGuideLst xmlns:p15="http://schemas.microsoft.com/office/powerpoint/2012/main"/>
+    </p:ext>
+  </p:extLst>
 </p:presentation>
 </file>
 
@@ -256,7 +261,7 @@
           <a:p>
             <a:fld id="{451567AF-4786-4675-82D0-F57CA9DB2954}" type="datetimeFigureOut">
               <a:rPr lang="en-GB" smtClean="0"/>
-              <a:t>31/12/2020</a:t>
+              <a:t>02/01/2021</a:t>
             </a:fld>
             <a:endParaRPr lang="en-GB"/>
           </a:p>
@@ -456,7 +461,7 @@
           <a:p>
             <a:fld id="{451567AF-4786-4675-82D0-F57CA9DB2954}" type="datetimeFigureOut">
               <a:rPr lang="en-GB" smtClean="0"/>
-              <a:t>31/12/2020</a:t>
+              <a:t>02/01/2021</a:t>
             </a:fld>
             <a:endParaRPr lang="en-GB"/>
           </a:p>
@@ -666,7 +671,7 @@
           <a:p>
             <a:fld id="{451567AF-4786-4675-82D0-F57CA9DB2954}" type="datetimeFigureOut">
               <a:rPr lang="en-GB" smtClean="0"/>
-              <a:t>31/12/2020</a:t>
+              <a:t>02/01/2021</a:t>
             </a:fld>
             <a:endParaRPr lang="en-GB"/>
           </a:p>
@@ -866,7 +871,7 @@
           <a:p>
             <a:fld id="{451567AF-4786-4675-82D0-F57CA9DB2954}" type="datetimeFigureOut">
               <a:rPr lang="en-GB" smtClean="0"/>
-              <a:t>31/12/2020</a:t>
+              <a:t>02/01/2021</a:t>
             </a:fld>
             <a:endParaRPr lang="en-GB"/>
           </a:p>
@@ -1142,7 +1147,7 @@
           <a:p>
             <a:fld id="{451567AF-4786-4675-82D0-F57CA9DB2954}" type="datetimeFigureOut">
               <a:rPr lang="en-GB" smtClean="0"/>
-              <a:t>31/12/2020</a:t>
+              <a:t>02/01/2021</a:t>
             </a:fld>
             <a:endParaRPr lang="en-GB"/>
           </a:p>
@@ -1410,7 +1415,7 @@
           <a:p>
             <a:fld id="{451567AF-4786-4675-82D0-F57CA9DB2954}" type="datetimeFigureOut">
               <a:rPr lang="en-GB" smtClean="0"/>
-              <a:t>31/12/2020</a:t>
+              <a:t>02/01/2021</a:t>
             </a:fld>
             <a:endParaRPr lang="en-GB"/>
           </a:p>
@@ -1825,7 +1830,7 @@
           <a:p>
             <a:fld id="{451567AF-4786-4675-82D0-F57CA9DB2954}" type="datetimeFigureOut">
               <a:rPr lang="en-GB" smtClean="0"/>
-              <a:t>31/12/2020</a:t>
+              <a:t>02/01/2021</a:t>
             </a:fld>
             <a:endParaRPr lang="en-GB"/>
           </a:p>
@@ -1967,7 +1972,7 @@
           <a:p>
             <a:fld id="{451567AF-4786-4675-82D0-F57CA9DB2954}" type="datetimeFigureOut">
               <a:rPr lang="en-GB" smtClean="0"/>
-              <a:t>31/12/2020</a:t>
+              <a:t>02/01/2021</a:t>
             </a:fld>
             <a:endParaRPr lang="en-GB"/>
           </a:p>
@@ -2080,7 +2085,7 @@
           <a:p>
             <a:fld id="{451567AF-4786-4675-82D0-F57CA9DB2954}" type="datetimeFigureOut">
               <a:rPr lang="en-GB" smtClean="0"/>
-              <a:t>31/12/2020</a:t>
+              <a:t>02/01/2021</a:t>
             </a:fld>
             <a:endParaRPr lang="en-GB"/>
           </a:p>
@@ -2393,7 +2398,7 @@
           <a:p>
             <a:fld id="{451567AF-4786-4675-82D0-F57CA9DB2954}" type="datetimeFigureOut">
               <a:rPr lang="en-GB" smtClean="0"/>
-              <a:t>31/12/2020</a:t>
+              <a:t>02/01/2021</a:t>
             </a:fld>
             <a:endParaRPr lang="en-GB"/>
           </a:p>
@@ -2682,7 +2687,7 @@
           <a:p>
             <a:fld id="{451567AF-4786-4675-82D0-F57CA9DB2954}" type="datetimeFigureOut">
               <a:rPr lang="en-GB" smtClean="0"/>
-              <a:t>31/12/2020</a:t>
+              <a:t>02/01/2021</a:t>
             </a:fld>
             <a:endParaRPr lang="en-GB"/>
           </a:p>
@@ -2925,7 +2930,7 @@
           <a:p>
             <a:fld id="{451567AF-4786-4675-82D0-F57CA9DB2954}" type="datetimeFigureOut">
               <a:rPr lang="en-GB" smtClean="0"/>
-              <a:t>31/12/2020</a:t>
+              <a:t>02/01/2021</a:t>
             </a:fld>
             <a:endParaRPr lang="en-GB"/>
           </a:p>
@@ -4595,6 +4600,56 @@
           </a:prstGeom>
         </p:spPr>
       </p:pic>
+      <p:pic>
+        <p:nvPicPr>
+          <p:cNvPr id="5" name="Picture 4">
+            <a:extLst>
+              <a:ext uri="{FF2B5EF4-FFF2-40B4-BE49-F238E27FC236}">
+                <a16:creationId xmlns:a16="http://schemas.microsoft.com/office/drawing/2014/main" id="{A635DBA0-31F7-40C6-A278-F2D7CB6CC0DE}"/>
+              </a:ext>
+            </a:extLst>
+          </p:cNvPr>
+          <p:cNvPicPr>
+            <a:picLocks noChangeAspect="1"/>
+          </p:cNvPicPr>
+          <p:nvPr/>
+        </p:nvPicPr>
+        <p:blipFill>
+          <a:blip r:embed="rId6">
+            <a:extLst>
+              <a:ext uri="{BEBA8EAE-BF5A-486C-A8C5-ECC9F3942E4B}">
+                <a14:imgProps xmlns:a14="http://schemas.microsoft.com/office/drawing/2010/main">
+                  <a14:imgLayer r:embed="rId7">
+                    <a14:imgEffect>
+                      <a14:backgroundRemoval t="0" b="100000" l="0" r="100000">
+                        <a14:foregroundMark x1="34000" y1="26000" x2="34000" y2="26000"/>
+                        <a14:foregroundMark x1="64000" y1="24000" x2="64000" y2="24000"/>
+                        <a14:foregroundMark x1="94000" y1="40000" x2="94000" y2="40000"/>
+                        <a14:foregroundMark x1="14000" y1="42000" x2="14000" y2="42000"/>
+                      </a14:backgroundRemoval>
+                    </a14:imgEffect>
+                  </a14:imgLayer>
+                </a14:imgProps>
+              </a:ext>
+              <a:ext uri="{28A0092B-C50C-407E-A947-70E740481C1C}">
+                <a14:useLocalDpi xmlns:a14="http://schemas.microsoft.com/office/drawing/2010/main" val="0"/>
+              </a:ext>
+            </a:extLst>
+          </a:blip>
+          <a:stretch>
+            <a:fillRect/>
+          </a:stretch>
+        </p:blipFill>
+        <p:spPr>
+          <a:xfrm>
+            <a:off x="5905483" y="3238483"/>
+            <a:ext cx="381033" cy="381033"/>
+          </a:xfrm>
+          <a:prstGeom prst="rect">
+            <a:avLst/>
+          </a:prstGeom>
+        </p:spPr>
+      </p:pic>
     </p:spTree>
     <p:extLst>
       <p:ext uri="{BB962C8B-B14F-4D97-AF65-F5344CB8AC3E}">

</xml_diff>

<commit_message>
add images and selects
</commit_message>
<xml_diff>
--- a/milosmission.pptx
+++ b/milosmission.pptx
@@ -261,7 +261,7 @@
           <a:p>
             <a:fld id="{451567AF-4786-4675-82D0-F57CA9DB2954}" type="datetimeFigureOut">
               <a:rPr lang="en-GB" smtClean="0"/>
-              <a:t>02/01/2021</a:t>
+              <a:t>04/01/2021</a:t>
             </a:fld>
             <a:endParaRPr lang="en-GB"/>
           </a:p>
@@ -461,7 +461,7 @@
           <a:p>
             <a:fld id="{451567AF-4786-4675-82D0-F57CA9DB2954}" type="datetimeFigureOut">
               <a:rPr lang="en-GB" smtClean="0"/>
-              <a:t>02/01/2021</a:t>
+              <a:t>04/01/2021</a:t>
             </a:fld>
             <a:endParaRPr lang="en-GB"/>
           </a:p>
@@ -671,7 +671,7 @@
           <a:p>
             <a:fld id="{451567AF-4786-4675-82D0-F57CA9DB2954}" type="datetimeFigureOut">
               <a:rPr lang="en-GB" smtClean="0"/>
-              <a:t>02/01/2021</a:t>
+              <a:t>04/01/2021</a:t>
             </a:fld>
             <a:endParaRPr lang="en-GB"/>
           </a:p>
@@ -871,7 +871,7 @@
           <a:p>
             <a:fld id="{451567AF-4786-4675-82D0-F57CA9DB2954}" type="datetimeFigureOut">
               <a:rPr lang="en-GB" smtClean="0"/>
-              <a:t>02/01/2021</a:t>
+              <a:t>04/01/2021</a:t>
             </a:fld>
             <a:endParaRPr lang="en-GB"/>
           </a:p>
@@ -1147,7 +1147,7 @@
           <a:p>
             <a:fld id="{451567AF-4786-4675-82D0-F57CA9DB2954}" type="datetimeFigureOut">
               <a:rPr lang="en-GB" smtClean="0"/>
-              <a:t>02/01/2021</a:t>
+              <a:t>04/01/2021</a:t>
             </a:fld>
             <a:endParaRPr lang="en-GB"/>
           </a:p>
@@ -1415,7 +1415,7 @@
           <a:p>
             <a:fld id="{451567AF-4786-4675-82D0-F57CA9DB2954}" type="datetimeFigureOut">
               <a:rPr lang="en-GB" smtClean="0"/>
-              <a:t>02/01/2021</a:t>
+              <a:t>04/01/2021</a:t>
             </a:fld>
             <a:endParaRPr lang="en-GB"/>
           </a:p>
@@ -1830,7 +1830,7 @@
           <a:p>
             <a:fld id="{451567AF-4786-4675-82D0-F57CA9DB2954}" type="datetimeFigureOut">
               <a:rPr lang="en-GB" smtClean="0"/>
-              <a:t>02/01/2021</a:t>
+              <a:t>04/01/2021</a:t>
             </a:fld>
             <a:endParaRPr lang="en-GB"/>
           </a:p>
@@ -1972,7 +1972,7 @@
           <a:p>
             <a:fld id="{451567AF-4786-4675-82D0-F57CA9DB2954}" type="datetimeFigureOut">
               <a:rPr lang="en-GB" smtClean="0"/>
-              <a:t>02/01/2021</a:t>
+              <a:t>04/01/2021</a:t>
             </a:fld>
             <a:endParaRPr lang="en-GB"/>
           </a:p>
@@ -2085,7 +2085,7 @@
           <a:p>
             <a:fld id="{451567AF-4786-4675-82D0-F57CA9DB2954}" type="datetimeFigureOut">
               <a:rPr lang="en-GB" smtClean="0"/>
-              <a:t>02/01/2021</a:t>
+              <a:t>04/01/2021</a:t>
             </a:fld>
             <a:endParaRPr lang="en-GB"/>
           </a:p>
@@ -2398,7 +2398,7 @@
           <a:p>
             <a:fld id="{451567AF-4786-4675-82D0-F57CA9DB2954}" type="datetimeFigureOut">
               <a:rPr lang="en-GB" smtClean="0"/>
-              <a:t>02/01/2021</a:t>
+              <a:t>04/01/2021</a:t>
             </a:fld>
             <a:endParaRPr lang="en-GB"/>
           </a:p>
@@ -2687,7 +2687,7 @@
           <a:p>
             <a:fld id="{451567AF-4786-4675-82D0-F57CA9DB2954}" type="datetimeFigureOut">
               <a:rPr lang="en-GB" smtClean="0"/>
-              <a:t>02/01/2021</a:t>
+              <a:t>04/01/2021</a:t>
             </a:fld>
             <a:endParaRPr lang="en-GB"/>
           </a:p>
@@ -2930,7 +2930,7 @@
           <a:p>
             <a:fld id="{451567AF-4786-4675-82D0-F57CA9DB2954}" type="datetimeFigureOut">
               <a:rPr lang="en-GB" smtClean="0"/>
-              <a:t>02/01/2021</a:t>
+              <a:t>04/01/2021</a:t>
             </a:fld>
             <a:endParaRPr lang="en-GB"/>
           </a:p>
@@ -4650,6 +4650,51 @@
           </a:prstGeom>
         </p:spPr>
       </p:pic>
+      <p:pic>
+        <p:nvPicPr>
+          <p:cNvPr id="27" name="Picture 26">
+            <a:extLst>
+              <a:ext uri="{FF2B5EF4-FFF2-40B4-BE49-F238E27FC236}">
+                <a16:creationId xmlns:a16="http://schemas.microsoft.com/office/drawing/2014/main" id="{EED72C8B-F157-4838-AE5F-5B37AF2DADAF}"/>
+              </a:ext>
+            </a:extLst>
+          </p:cNvPr>
+          <p:cNvPicPr>
+            <a:picLocks noChangeAspect="1"/>
+          </p:cNvPicPr>
+          <p:nvPr/>
+        </p:nvPicPr>
+        <p:blipFill>
+          <a:blip r:embed="rId8">
+            <a:extLst>
+              <a:ext uri="{BEBA8EAE-BF5A-486C-A8C5-ECC9F3942E4B}">
+                <a14:imgProps xmlns:a14="http://schemas.microsoft.com/office/drawing/2010/main">
+                  <a14:imgLayer r:embed="rId9">
+                    <a14:imgEffect>
+                      <a14:backgroundRemoval t="10000" b="90000" l="10000" r="90000"/>
+                    </a14:imgEffect>
+                  </a14:imgLayer>
+                </a14:imgProps>
+              </a:ext>
+              <a:ext uri="{28A0092B-C50C-407E-A947-70E740481C1C}">
+                <a14:useLocalDpi xmlns:a14="http://schemas.microsoft.com/office/drawing/2010/main" val="0"/>
+              </a:ext>
+            </a:extLst>
+          </a:blip>
+          <a:stretch>
+            <a:fillRect/>
+          </a:stretch>
+        </p:blipFill>
+        <p:spPr>
+          <a:xfrm>
+            <a:off x="6567934" y="1115185"/>
+            <a:ext cx="4876800" cy="3657600"/>
+          </a:xfrm>
+          <a:prstGeom prst="rect">
+            <a:avLst/>
+          </a:prstGeom>
+        </p:spPr>
+      </p:pic>
     </p:spTree>
     <p:extLst>
       <p:ext uri="{BB962C8B-B14F-4D97-AF65-F5344CB8AC3E}">

</xml_diff>